<commit_message>
Updated slide 6 presentation 1
</commit_message>
<xml_diff>
--- a/Presentation 1 Climate Change Problem.pptx
+++ b/Presentation 1 Climate Change Problem.pptx
@@ -10,6 +10,7 @@
     <p:sldId id="258" r:id="rId4"/>
     <p:sldId id="259" r:id="rId5"/>
     <p:sldId id="260" r:id="rId6"/>
+    <p:sldId id="261" r:id="rId7"/>
   </p:sldIdLst>
   <p:sldSz cx="12192000" cy="6858000"/>
   <p:notesSz cx="6858000" cy="9144000"/>
@@ -3468,12 +3469,59 @@
           <a:p>
             <a:r>
               <a:rPr lang="en-GB" dirty="0"/>
-              <a:t>But: Monthly data smaller (</a:t>
-            </a:r>
-            <a:r>
-              <a:rPr lang="en-GB"/>
-              <a:t>for temperature “only” 250GB) </a:t>
-            </a:r>
+              <a:t>But: Monthly data smaller (for temperature “only” 250GB) </a:t>
+            </a:r>
+          </a:p>
+          <a:p>
+            <a:r>
+              <a:rPr lang="en-GB" dirty="0"/>
+              <a:t>(this doesn’t need to be presented, but: monthly data in total 6TB)</a:t>
+            </a:r>
+          </a:p>
+          <a:p>
+            <a:r>
+              <a:rPr lang="en-GB" dirty="0"/>
+              <a:t>Note to us: If we only look at formatted data (not native), monthly, for </a:t>
+            </a:r>
+            <a:r>
+              <a:rPr lang="en-GB" dirty="0" err="1"/>
+              <a:t>tas</a:t>
+            </a:r>
+            <a:r>
+              <a:rPr lang="en-GB" dirty="0"/>
+              <a:t>, </a:t>
+            </a:r>
+            <a:r>
+              <a:rPr lang="en-GB" dirty="0" err="1"/>
+              <a:t>tasmax</a:t>
+            </a:r>
+            <a:r>
+              <a:rPr lang="en-GB" dirty="0"/>
+              <a:t>, </a:t>
+            </a:r>
+            <a:r>
+              <a:rPr lang="en-GB" dirty="0" err="1"/>
+              <a:t>tasmin</a:t>
+            </a:r>
+            <a:r>
+              <a:rPr lang="en-GB" dirty="0"/>
+              <a:t> and precipitation (</a:t>
+            </a:r>
+            <a:r>
+              <a:rPr lang="en-GB" dirty="0" err="1"/>
+              <a:t>pr</a:t>
+            </a:r>
+            <a:r>
+              <a:rPr lang="en-GB" dirty="0"/>
+              <a:t>) the total size is ~250GB </a:t>
+            </a:r>
+            <a:r>
+              <a:rPr lang="en-GB" dirty="0">
+                <a:sym typeface="Wingdings" panose="05000000000000000000" pitchFamily="2" charset="2"/>
+              </a:rPr>
+              <a:t> doable</a:t>
+            </a:r>
+            <a:endParaRPr lang="en-GB" dirty="0"/>
           </a:p>
           <a:p>
             <a:endParaRPr lang="en-GB" dirty="0"/>
@@ -3487,6 +3535,141 @@
     <p:extLst>
       <p:ext uri="{BB962C8B-B14F-4D97-AF65-F5344CB8AC3E}">
         <p14:creationId xmlns:p14="http://schemas.microsoft.com/office/powerpoint/2010/main" val="536020302"/>
+      </p:ext>
+    </p:extLst>
+  </p:cSld>
+  <p:clrMapOvr>
+    <a:masterClrMapping/>
+  </p:clrMapOvr>
+</p:sld>
+</file>
+
+<file path=ppt/slides/slide6.xml><?xml version="1.0" encoding="utf-8"?>
+<p:sld xmlns:a="http://schemas.openxmlformats.org/drawingml/2006/main" xmlns:r="http://schemas.openxmlformats.org/officeDocument/2006/relationships" xmlns:p="http://schemas.openxmlformats.org/presentationml/2006/main">
+  <p:cSld>
+    <p:spTree>
+      <p:nvGrpSpPr>
+        <p:cNvPr id="1" name=""/>
+        <p:cNvGrpSpPr/>
+        <p:nvPr/>
+      </p:nvGrpSpPr>
+      <p:grpSpPr>
+        <a:xfrm>
+          <a:off x="0" y="0"/>
+          <a:ext cx="0" cy="0"/>
+          <a:chOff x="0" y="0"/>
+          <a:chExt cx="0" cy="0"/>
+        </a:xfrm>
+      </p:grpSpPr>
+      <p:sp>
+        <p:nvSpPr>
+          <p:cNvPr id="2" name="Titel 1"/>
+          <p:cNvSpPr>
+            <a:spLocks noGrp="1"/>
+          </p:cNvSpPr>
+          <p:nvPr>
+            <p:ph type="title"/>
+          </p:nvPr>
+        </p:nvSpPr>
+        <p:spPr/>
+        <p:txBody>
+          <a:bodyPr/>
+          <a:lstStyle/>
+          <a:p>
+            <a:r>
+              <a:rPr lang="en-GB" dirty="0"/>
+              <a:t>What we want to do (insert catchy title)</a:t>
+            </a:r>
+            <a:endParaRPr lang="de-DE" dirty="0"/>
+          </a:p>
+        </p:txBody>
+      </p:sp>
+      <p:sp>
+        <p:nvSpPr>
+          <p:cNvPr id="3" name="Inhaltsplatzhalter 2"/>
+          <p:cNvSpPr>
+            <a:spLocks noGrp="1"/>
+          </p:cNvSpPr>
+          <p:nvPr>
+            <p:ph idx="1"/>
+          </p:nvPr>
+        </p:nvSpPr>
+        <p:spPr/>
+        <p:txBody>
+          <a:bodyPr/>
+          <a:lstStyle/>
+          <a:p>
+            <a:r>
+              <a:rPr lang="en-GB" dirty="0"/>
+              <a:t>Define different metrics to measure distance between models</a:t>
+            </a:r>
+          </a:p>
+          <a:p>
+            <a:pPr marL="0" indent="0">
+              <a:buNone/>
+            </a:pPr>
+            <a:r>
+              <a:rPr lang="en-GB" dirty="0">
+                <a:sym typeface="Wingdings" panose="05000000000000000000" pitchFamily="2" charset="2"/>
+              </a:rPr>
+              <a:t>just sum over squared distances (My idea, happy about your input guys)</a:t>
+            </a:r>
+          </a:p>
+          <a:p>
+            <a:pPr>
+              <a:buFont typeface="Wingdings" panose="05000000000000000000" pitchFamily="2" charset="2"/>
+              <a:buChar char="à"/>
+            </a:pPr>
+            <a:r>
+              <a:rPr lang="en-GB" dirty="0">
+                <a:sym typeface="Wingdings" panose="05000000000000000000" pitchFamily="2" charset="2"/>
+              </a:rPr>
+              <a:t>Use general principal component analysis to define weight matrices (write this correctly, idea from </a:t>
+            </a:r>
+            <a:r>
+              <a:rPr lang="en-GB" dirty="0" err="1">
+                <a:sym typeface="Wingdings" panose="05000000000000000000" pitchFamily="2" charset="2"/>
+              </a:rPr>
+              <a:t>knutti</a:t>
+            </a:r>
+            <a:r>
+              <a:rPr lang="en-GB" dirty="0">
+                <a:sym typeface="Wingdings" panose="05000000000000000000" pitchFamily="2" charset="2"/>
+              </a:rPr>
+              <a:t> paper)</a:t>
+            </a:r>
+          </a:p>
+          <a:p>
+            <a:pPr marL="0" indent="0">
+              <a:buNone/>
+            </a:pPr>
+            <a:endParaRPr lang="en-GB" dirty="0">
+              <a:sym typeface="Wingdings" panose="05000000000000000000" pitchFamily="2" charset="2"/>
+            </a:endParaRPr>
+          </a:p>
+          <a:p>
+            <a:pPr marL="0" indent="0">
+              <a:buNone/>
+            </a:pPr>
+            <a:r>
+              <a:rPr lang="en-GB" dirty="0">
+                <a:sym typeface="Wingdings" panose="05000000000000000000" pitchFamily="2" charset="2"/>
+              </a:rPr>
+              <a:t>Problems for all approaches: Models are tuned to fit observations well (no organization wants to have an “outlier” model, even though this could </a:t>
+            </a:r>
+            <a:r>
+              <a:rPr lang="en-GB">
+                <a:sym typeface="Wingdings" panose="05000000000000000000" pitchFamily="2" charset="2"/>
+              </a:rPr>
+              <a:t>prove useful) </a:t>
+            </a:r>
+          </a:p>
+        </p:txBody>
+      </p:sp>
+    </p:spTree>
+    <p:extLst>
+      <p:ext uri="{BB962C8B-B14F-4D97-AF65-F5344CB8AC3E}">
+        <p14:creationId xmlns:p14="http://schemas.microsoft.com/office/powerpoint/2010/main" val="1493789355"/>
       </p:ext>
     </p:extLst>
   </p:cSld>

</xml_diff>

<commit_message>
updated .gif R file and updated Presentation
</commit_message>
<xml_diff>
--- a/Presentation 1 Climate Change Problem.pptx
+++ b/Presentation 1 Climate Change Problem.pptx
@@ -6,11 +6,11 @@
   </p:sldMasterIdLst>
   <p:sldIdLst>
     <p:sldId id="256" r:id="rId2"/>
-    <p:sldId id="257" r:id="rId3"/>
-    <p:sldId id="258" r:id="rId4"/>
-    <p:sldId id="259" r:id="rId5"/>
-    <p:sldId id="260" r:id="rId6"/>
-    <p:sldId id="261" r:id="rId7"/>
+    <p:sldId id="258" r:id="rId3"/>
+    <p:sldId id="259" r:id="rId4"/>
+    <p:sldId id="260" r:id="rId5"/>
+    <p:sldId id="261" r:id="rId6"/>
+    <p:sldId id="262" r:id="rId7"/>
   </p:sldIdLst>
   <p:sldSz cx="12192000" cy="6858000"/>
   <p:notesSz cx="6858000" cy="9144000"/>
@@ -109,6 +109,11 @@
       </a:defRPr>
     </a:lvl9pPr>
   </p:defaultTextStyle>
+  <p:extLst>
+    <p:ext uri="{EFAFB233-063F-42B5-8137-9DF3F51BA10A}">
+      <p15:sldGuideLst xmlns:p15="http://schemas.microsoft.com/office/powerpoint/2012/main"/>
+    </p:ext>
+  </p:extLst>
 </p:presentation>
 </file>
 
@@ -157,7 +162,6 @@
               <a:rPr lang="de-DE"/>
               <a:t>Titelmasterformat durch Klicken bearbeiten</a:t>
             </a:r>
-            <a:endParaRPr lang="de-DE"/>
           </a:p>
         </p:txBody>
       </p:sp>
@@ -222,7 +226,6 @@
               <a:rPr lang="de-DE"/>
               <a:t>Formatvorlage des Untertitelmasters durch Klicken bearbeiten</a:t>
             </a:r>
-            <a:endParaRPr lang="de-DE"/>
           </a:p>
         </p:txBody>
       </p:sp>
@@ -243,7 +246,7 @@
           <a:p>
             <a:fld id="{65A2F1D0-D74D-4FA1-9D1C-0A020EE8C3F6}" type="datetimeFigureOut">
               <a:rPr lang="de-DE" smtClean="0"/>
-              <a:t>11.02.2017</a:t>
+              <a:t>21.02.2017</a:t>
             </a:fld>
             <a:endParaRPr lang="de-DE"/>
           </a:p>
@@ -340,7 +343,6 @@
               <a:rPr lang="de-DE"/>
               <a:t>Titelmasterformat durch Klicken bearbeiten</a:t>
             </a:r>
-            <a:endParaRPr lang="de-DE"/>
           </a:p>
         </p:txBody>
       </p:sp>
@@ -392,7 +394,6 @@
               <a:rPr lang="de-DE"/>
               <a:t>Fünfte Ebene</a:t>
             </a:r>
-            <a:endParaRPr lang="de-DE"/>
           </a:p>
         </p:txBody>
       </p:sp>
@@ -413,7 +414,7 @@
           <a:p>
             <a:fld id="{65A2F1D0-D74D-4FA1-9D1C-0A020EE8C3F6}" type="datetimeFigureOut">
               <a:rPr lang="de-DE" smtClean="0"/>
-              <a:t>11.02.2017</a:t>
+              <a:t>21.02.2017</a:t>
             </a:fld>
             <a:endParaRPr lang="de-DE"/>
           </a:p>
@@ -515,7 +516,6 @@
               <a:rPr lang="de-DE"/>
               <a:t>Titelmasterformat durch Klicken bearbeiten</a:t>
             </a:r>
-            <a:endParaRPr lang="de-DE"/>
           </a:p>
         </p:txBody>
       </p:sp>
@@ -572,7 +572,6 @@
               <a:rPr lang="de-DE"/>
               <a:t>Fünfte Ebene</a:t>
             </a:r>
-            <a:endParaRPr lang="de-DE"/>
           </a:p>
         </p:txBody>
       </p:sp>
@@ -593,7 +592,7 @@
           <a:p>
             <a:fld id="{65A2F1D0-D74D-4FA1-9D1C-0A020EE8C3F6}" type="datetimeFigureOut">
               <a:rPr lang="de-DE" smtClean="0"/>
-              <a:t>11.02.2017</a:t>
+              <a:t>21.02.2017</a:t>
             </a:fld>
             <a:endParaRPr lang="de-DE"/>
           </a:p>
@@ -690,7 +689,6 @@
               <a:rPr lang="de-DE"/>
               <a:t>Titelmasterformat durch Klicken bearbeiten</a:t>
             </a:r>
-            <a:endParaRPr lang="de-DE"/>
           </a:p>
         </p:txBody>
       </p:sp>
@@ -742,7 +740,6 @@
               <a:rPr lang="de-DE"/>
               <a:t>Fünfte Ebene</a:t>
             </a:r>
-            <a:endParaRPr lang="de-DE"/>
           </a:p>
         </p:txBody>
       </p:sp>
@@ -763,7 +760,7 @@
           <a:p>
             <a:fld id="{65A2F1D0-D74D-4FA1-9D1C-0A020EE8C3F6}" type="datetimeFigureOut">
               <a:rPr lang="de-DE" smtClean="0"/>
-              <a:t>11.02.2017</a:t>
+              <a:t>21.02.2017</a:t>
             </a:fld>
             <a:endParaRPr lang="de-DE"/>
           </a:p>
@@ -869,7 +866,6 @@
               <a:rPr lang="de-DE"/>
               <a:t>Titelmasterformat durch Klicken bearbeiten</a:t>
             </a:r>
-            <a:endParaRPr lang="de-DE"/>
           </a:p>
         </p:txBody>
       </p:sp>
@@ -1009,7 +1005,7 @@
           <a:p>
             <a:fld id="{65A2F1D0-D74D-4FA1-9D1C-0A020EE8C3F6}" type="datetimeFigureOut">
               <a:rPr lang="de-DE" smtClean="0"/>
-              <a:t>11.02.2017</a:t>
+              <a:t>21.02.2017</a:t>
             </a:fld>
             <a:endParaRPr lang="de-DE"/>
           </a:p>
@@ -1106,7 +1102,6 @@
               <a:rPr lang="de-DE"/>
               <a:t>Titelmasterformat durch Klicken bearbeiten</a:t>
             </a:r>
-            <a:endParaRPr lang="de-DE"/>
           </a:p>
         </p:txBody>
       </p:sp>
@@ -1163,7 +1158,6 @@
               <a:rPr lang="de-DE"/>
               <a:t>Fünfte Ebene</a:t>
             </a:r>
-            <a:endParaRPr lang="de-DE"/>
           </a:p>
         </p:txBody>
       </p:sp>
@@ -1220,7 +1214,6 @@
               <a:rPr lang="de-DE"/>
               <a:t>Fünfte Ebene</a:t>
             </a:r>
-            <a:endParaRPr lang="de-DE"/>
           </a:p>
         </p:txBody>
       </p:sp>
@@ -1241,7 +1234,7 @@
           <a:p>
             <a:fld id="{65A2F1D0-D74D-4FA1-9D1C-0A020EE8C3F6}" type="datetimeFigureOut">
               <a:rPr lang="de-DE" smtClean="0"/>
-              <a:t>11.02.2017</a:t>
+              <a:t>21.02.2017</a:t>
             </a:fld>
             <a:endParaRPr lang="de-DE"/>
           </a:p>
@@ -1343,7 +1336,6 @@
               <a:rPr lang="de-DE"/>
               <a:t>Titelmasterformat durch Klicken bearbeiten</a:t>
             </a:r>
-            <a:endParaRPr lang="de-DE"/>
           </a:p>
         </p:txBody>
       </p:sp>
@@ -1465,7 +1457,6 @@
               <a:rPr lang="de-DE"/>
               <a:t>Fünfte Ebene</a:t>
             </a:r>
-            <a:endParaRPr lang="de-DE"/>
           </a:p>
         </p:txBody>
       </p:sp>
@@ -1587,7 +1578,6 @@
               <a:rPr lang="de-DE"/>
               <a:t>Fünfte Ebene</a:t>
             </a:r>
-            <a:endParaRPr lang="de-DE"/>
           </a:p>
         </p:txBody>
       </p:sp>
@@ -1608,7 +1598,7 @@
           <a:p>
             <a:fld id="{65A2F1D0-D74D-4FA1-9D1C-0A020EE8C3F6}" type="datetimeFigureOut">
               <a:rPr lang="de-DE" smtClean="0"/>
-              <a:t>11.02.2017</a:t>
+              <a:t>21.02.2017</a:t>
             </a:fld>
             <a:endParaRPr lang="de-DE"/>
           </a:p>
@@ -1705,7 +1695,6 @@
               <a:rPr lang="de-DE"/>
               <a:t>Titelmasterformat durch Klicken bearbeiten</a:t>
             </a:r>
-            <a:endParaRPr lang="de-DE"/>
           </a:p>
         </p:txBody>
       </p:sp>
@@ -1726,7 +1715,7 @@
           <a:p>
             <a:fld id="{65A2F1D0-D74D-4FA1-9D1C-0A020EE8C3F6}" type="datetimeFigureOut">
               <a:rPr lang="de-DE" smtClean="0"/>
-              <a:t>11.02.2017</a:t>
+              <a:t>21.02.2017</a:t>
             </a:fld>
             <a:endParaRPr lang="de-DE"/>
           </a:p>
@@ -1821,7 +1810,7 @@
           <a:p>
             <a:fld id="{65A2F1D0-D74D-4FA1-9D1C-0A020EE8C3F6}" type="datetimeFigureOut">
               <a:rPr lang="de-DE" smtClean="0"/>
-              <a:t>11.02.2017</a:t>
+              <a:t>21.02.2017</a:t>
             </a:fld>
             <a:endParaRPr lang="de-DE"/>
           </a:p>
@@ -1927,7 +1916,6 @@
               <a:rPr lang="de-DE"/>
               <a:t>Titelmasterformat durch Klicken bearbeiten</a:t>
             </a:r>
-            <a:endParaRPr lang="de-DE"/>
           </a:p>
         </p:txBody>
       </p:sp>
@@ -2012,7 +2000,6 @@
               <a:rPr lang="de-DE"/>
               <a:t>Fünfte Ebene</a:t>
             </a:r>
-            <a:endParaRPr lang="de-DE"/>
           </a:p>
         </p:txBody>
       </p:sp>
@@ -2098,7 +2085,7 @@
           <a:p>
             <a:fld id="{65A2F1D0-D74D-4FA1-9D1C-0A020EE8C3F6}" type="datetimeFigureOut">
               <a:rPr lang="de-DE" smtClean="0"/>
-              <a:t>11.02.2017</a:t>
+              <a:t>21.02.2017</a:t>
             </a:fld>
             <a:endParaRPr lang="de-DE"/>
           </a:p>
@@ -2204,7 +2191,6 @@
               <a:rPr lang="de-DE"/>
               <a:t>Titelmasterformat durch Klicken bearbeiten</a:t>
             </a:r>
-            <a:endParaRPr lang="de-DE"/>
           </a:p>
         </p:txBody>
       </p:sp>
@@ -2351,7 +2337,7 @@
           <a:p>
             <a:fld id="{65A2F1D0-D74D-4FA1-9D1C-0A020EE8C3F6}" type="datetimeFigureOut">
               <a:rPr lang="de-DE" smtClean="0"/>
-              <a:t>11.02.2017</a:t>
+              <a:t>21.02.2017</a:t>
             </a:fld>
             <a:endParaRPr lang="de-DE"/>
           </a:p>
@@ -2463,7 +2449,6 @@
               <a:rPr lang="de-DE"/>
               <a:t>Titelmasterformat durch Klicken bearbeiten</a:t>
             </a:r>
-            <a:endParaRPr lang="de-DE"/>
           </a:p>
         </p:txBody>
       </p:sp>
@@ -2525,7 +2510,6 @@
               <a:rPr lang="de-DE"/>
               <a:t>Fünfte Ebene</a:t>
             </a:r>
-            <a:endParaRPr lang="de-DE"/>
           </a:p>
         </p:txBody>
       </p:sp>
@@ -2564,7 +2548,7 @@
           <a:p>
             <a:fld id="{65A2F1D0-D74D-4FA1-9D1C-0A020EE8C3F6}" type="datetimeFigureOut">
               <a:rPr lang="de-DE" smtClean="0"/>
-              <a:t>11.02.2017</a:t>
+              <a:t>21.02.2017</a:t>
             </a:fld>
             <a:endParaRPr lang="de-DE"/>
           </a:p>
@@ -3062,7 +3046,7 @@
           <a:p>
             <a:r>
               <a:rPr lang="en-GB" dirty="0"/>
-              <a:t>Maybe a slide about climate change and why models are important?	</a:t>
+              <a:t>Climate models	</a:t>
             </a:r>
             <a:endParaRPr lang="de-DE" dirty="0"/>
           </a:p>
@@ -3084,39 +3068,69 @@
           <a:lstStyle/>
           <a:p>
             <a:r>
-              <a:rPr lang="en-GB" dirty="0" err="1"/>
-              <a:t>Blablabla</a:t>
-            </a:r>
-            <a:r>
               <a:rPr lang="en-GB" dirty="0"/>
-              <a:t> effects affect all…</a:t>
-            </a:r>
-          </a:p>
-          <a:p>
-            <a:r>
-              <a:rPr lang="en-GB" dirty="0" err="1"/>
-              <a:t>Blablabla</a:t>
-            </a:r>
+              <a:t>Model earth based on a grid</a:t>
+            </a:r>
+          </a:p>
+          <a:p>
             <a:r>
               <a:rPr lang="en-GB" dirty="0"/>
-              <a:t> long-term process but has to be countered in short-term </a:t>
-            </a:r>
-            <a:r>
-              <a:rPr lang="en-GB" dirty="0">
-                <a:sym typeface="Wingdings" panose="05000000000000000000" pitchFamily="2" charset="2"/>
-              </a:rPr>
-              <a:t> models important </a:t>
-            </a:r>
-          </a:p>
-          <a:p>
+              <a:t>Try to model the main physical and chemical processes as best as possible.</a:t>
+            </a:r>
+          </a:p>
+          <a:p>
+            <a:r>
+              <a:rPr lang="en-GB" dirty="0"/>
+              <a:t>3 kinds of uncertainties:</a:t>
+            </a:r>
             <a:endParaRPr lang="de-DE" dirty="0"/>
+          </a:p>
+          <a:p>
+            <a:pPr marL="914400" lvl="1" indent="-457200">
+              <a:buFont typeface="+mj-lt"/>
+              <a:buAutoNum type="arabicPeriod"/>
+            </a:pPr>
+            <a:r>
+              <a:rPr lang="en-GB" dirty="0"/>
+              <a:t>Model uncertainty: Physical processes might not be accurately modelled,…</a:t>
+            </a:r>
+          </a:p>
+          <a:p>
+            <a:pPr marL="914400" lvl="1" indent="-457200">
+              <a:buFont typeface="+mj-lt"/>
+              <a:buAutoNum type="arabicPeriod"/>
+            </a:pPr>
+            <a:r>
+              <a:rPr lang="en-GB" dirty="0"/>
+              <a:t>Scenario uncertainty: Projected Carbon emissions might not realize,…</a:t>
+            </a:r>
+          </a:p>
+          <a:p>
+            <a:pPr marL="914400" lvl="1" indent="-457200">
+              <a:buFont typeface="+mj-lt"/>
+              <a:buAutoNum type="arabicPeriod"/>
+            </a:pPr>
+            <a:r>
+              <a:rPr lang="en-GB" dirty="0"/>
+              <a:t>Initial condition uncertainty: Observations for presence might be missing,… </a:t>
+            </a:r>
+            <a:endParaRPr lang="de-DE" dirty="0"/>
+          </a:p>
+          <a:p>
+            <a:r>
+              <a:rPr lang="en-GB" dirty="0"/>
+              <a:t>Scenario uncertainty important for long-term, initial condition uncertainty for short-term, model uncertainty always important</a:t>
+            </a:r>
+          </a:p>
+          <a:p>
+            <a:endParaRPr lang="en-GB" dirty="0"/>
           </a:p>
         </p:txBody>
       </p:sp>
     </p:spTree>
     <p:extLst>
       <p:ext uri="{BB962C8B-B14F-4D97-AF65-F5344CB8AC3E}">
-        <p14:creationId xmlns:p14="http://schemas.microsoft.com/office/powerpoint/2010/main" val="3482402891"/>
+        <p14:creationId xmlns:p14="http://schemas.microsoft.com/office/powerpoint/2010/main" val="2232323050"/>
       </p:ext>
     </p:extLst>
   </p:cSld>
@@ -3160,7 +3174,7 @@
           <a:p>
             <a:r>
               <a:rPr lang="en-GB" dirty="0"/>
-              <a:t>Climate models	</a:t>
+              <a:t>Model ensemble	</a:t>
             </a:r>
             <a:endParaRPr lang="de-DE" dirty="0"/>
           </a:p>
@@ -3183,68 +3197,92 @@
           <a:p>
             <a:r>
               <a:rPr lang="en-GB" dirty="0"/>
-              <a:t>Model earth based on a grid</a:t>
+              <a:t>Different models, run under different scenarios</a:t>
             </a:r>
           </a:p>
           <a:p>
             <a:r>
               <a:rPr lang="en-GB" dirty="0"/>
-              <a:t>Try to model the main physical and chemical processes as good as possible.</a:t>
+              <a:t>Used to get more robust forecasts</a:t>
             </a:r>
           </a:p>
           <a:p>
             <a:r>
               <a:rPr lang="en-GB" dirty="0"/>
-              <a:t>3 kinds of uncertainties:</a:t>
+              <a:t>Fundamental dilemma: For most statistical inference independence assumptions are used (i.e. confidence interval)</a:t>
+            </a:r>
+          </a:p>
+          <a:p>
+            <a:r>
+              <a:rPr lang="en-GB" dirty="0"/>
+              <a:t>Models are ~1 million lines of code </a:t>
+            </a:r>
+            <a:r>
+              <a:rPr lang="en-GB" dirty="0">
+                <a:sym typeface="Wingdings" panose="05000000000000000000" pitchFamily="2" charset="2"/>
+              </a:rPr>
+              <a:t> reused for new generations from same </a:t>
+            </a:r>
+            <a:r>
+              <a:rPr lang="en-GB" dirty="0" err="1">
+                <a:sym typeface="Wingdings" panose="05000000000000000000" pitchFamily="2" charset="2"/>
+              </a:rPr>
+              <a:t>center</a:t>
+            </a:r>
+            <a:r>
+              <a:rPr lang="en-GB" dirty="0">
+                <a:sym typeface="Wingdings" panose="05000000000000000000" pitchFamily="2" charset="2"/>
+              </a:rPr>
+              <a:t>, or shared within modelling </a:t>
+            </a:r>
+            <a:r>
+              <a:rPr lang="en-GB" dirty="0" err="1">
+                <a:sym typeface="Wingdings" panose="05000000000000000000" pitchFamily="2" charset="2"/>
+              </a:rPr>
+              <a:t>centers</a:t>
+            </a:r>
+            <a:r>
+              <a:rPr lang="en-GB" dirty="0">
+                <a:sym typeface="Wingdings" panose="05000000000000000000" pitchFamily="2" charset="2"/>
+              </a:rPr>
+              <a:t>  clearly not independent</a:t>
+            </a:r>
+          </a:p>
+          <a:p>
+            <a:r>
+              <a:rPr lang="en-GB" dirty="0">
+                <a:sym typeface="Wingdings" panose="05000000000000000000" pitchFamily="2" charset="2"/>
+              </a:rPr>
+              <a:t>Problem: How to measure “distance” between models?</a:t>
+            </a:r>
+          </a:p>
+          <a:p>
+            <a:r>
+              <a:rPr lang="en-GB" dirty="0">
+                <a:sym typeface="Wingdings" panose="05000000000000000000" pitchFamily="2" charset="2"/>
+              </a:rPr>
+              <a:t>Idea: STAT 243: General principal component analysis (</a:t>
+            </a:r>
+            <a:r>
+              <a:rPr lang="en-GB" dirty="0" err="1">
+                <a:sym typeface="Wingdings" panose="05000000000000000000" pitchFamily="2" charset="2"/>
+              </a:rPr>
+              <a:t>Knutti</a:t>
+            </a:r>
+            <a:r>
+              <a:rPr lang="en-GB" dirty="0">
+                <a:sym typeface="Wingdings" panose="05000000000000000000" pitchFamily="2" charset="2"/>
+              </a:rPr>
+              <a:t>, 2012)</a:t>
             </a:r>
             <a:endParaRPr lang="de-DE" dirty="0"/>
-          </a:p>
-          <a:p>
-            <a:pPr marL="914400" lvl="1" indent="-457200">
-              <a:buFont typeface="+mj-lt"/>
-              <a:buAutoNum type="arabicPeriod"/>
-            </a:pPr>
-            <a:r>
-              <a:rPr lang="en-GB" dirty="0"/>
-              <a:t>Model uncertainty: Physical processes might not be accurately modelled,…</a:t>
-            </a:r>
-          </a:p>
-          <a:p>
-            <a:pPr marL="914400" lvl="1" indent="-457200">
-              <a:buFont typeface="+mj-lt"/>
-              <a:buAutoNum type="arabicPeriod"/>
-            </a:pPr>
-            <a:r>
-              <a:rPr lang="en-GB" dirty="0"/>
-              <a:t>Scenario uncertainty: Projected Carbon emissions might not realize,…</a:t>
-            </a:r>
-          </a:p>
-          <a:p>
-            <a:pPr marL="914400" lvl="1" indent="-457200">
-              <a:buFont typeface="+mj-lt"/>
-              <a:buAutoNum type="arabicPeriod"/>
-            </a:pPr>
-            <a:r>
-              <a:rPr lang="en-GB" dirty="0"/>
-              <a:t>Initial condition uncertainty: Observations for presence might be missing,… </a:t>
-            </a:r>
-            <a:endParaRPr lang="de-DE" dirty="0"/>
-          </a:p>
-          <a:p>
-            <a:r>
-              <a:rPr lang="en-GB" dirty="0"/>
-              <a:t>Scenario uncertainty important for long-term, initial condition uncertainty for short-term, model uncertainty always important</a:t>
-            </a:r>
-          </a:p>
-          <a:p>
-            <a:endParaRPr lang="en-GB" dirty="0"/>
           </a:p>
         </p:txBody>
       </p:sp>
     </p:spTree>
     <p:extLst>
       <p:ext uri="{BB962C8B-B14F-4D97-AF65-F5344CB8AC3E}">
-        <p14:creationId xmlns:p14="http://schemas.microsoft.com/office/powerpoint/2010/main" val="2232323050"/>
+        <p14:creationId xmlns:p14="http://schemas.microsoft.com/office/powerpoint/2010/main" val="2931790041"/>
       </p:ext>
     </p:extLst>
   </p:cSld>
@@ -3288,7 +3326,7 @@
           <a:p>
             <a:r>
               <a:rPr lang="en-GB" dirty="0"/>
-              <a:t>Model ensemble	</a:t>
+              <a:t>Data	</a:t>
             </a:r>
             <a:endParaRPr lang="de-DE" dirty="0"/>
           </a:p>
@@ -3311,92 +3349,102 @@
           <a:p>
             <a:r>
               <a:rPr lang="en-GB" dirty="0"/>
-              <a:t>Different models, run under different scenarios</a:t>
+              <a:t>In total:17TB, temperature alone 3TB</a:t>
             </a:r>
           </a:p>
           <a:p>
             <a:r>
               <a:rPr lang="en-GB" dirty="0"/>
-              <a:t>Used to get more robust forecasts</a:t>
+              <a:t>But: Monthly data smaller (for temperature “only” 250GB) </a:t>
             </a:r>
           </a:p>
           <a:p>
             <a:r>
               <a:rPr lang="en-GB" dirty="0"/>
-              <a:t>Fundamental dilemma: For most statistical inference independence assumptions are used (i.e. confidence interval)</a:t>
+              <a:t>(this doesn’t need to be presented, but: monthly data in total 6TB)</a:t>
             </a:r>
           </a:p>
           <a:p>
             <a:r>
               <a:rPr lang="en-GB" dirty="0"/>
-              <a:t>Models are ~1 million lines of code </a:t>
+              <a:t>Note to us: If we only look at formatted data (not native), monthly, for </a:t>
+            </a:r>
+            <a:r>
+              <a:rPr lang="en-GB" dirty="0" err="1"/>
+              <a:t>tas</a:t>
+            </a:r>
+            <a:r>
+              <a:rPr lang="en-GB" dirty="0"/>
+              <a:t>, </a:t>
+            </a:r>
+            <a:r>
+              <a:rPr lang="en-GB" dirty="0" err="1"/>
+              <a:t>tasmax</a:t>
+            </a:r>
+            <a:r>
+              <a:rPr lang="en-GB" dirty="0"/>
+              <a:t>, </a:t>
+            </a:r>
+            <a:r>
+              <a:rPr lang="en-GB" dirty="0" err="1"/>
+              <a:t>tasmin</a:t>
+            </a:r>
+            <a:r>
+              <a:rPr lang="en-GB" dirty="0"/>
+              <a:t> and precipitation (</a:t>
+            </a:r>
+            <a:r>
+              <a:rPr lang="en-GB" dirty="0" err="1"/>
+              <a:t>pr</a:t>
+            </a:r>
+            <a:r>
+              <a:rPr lang="en-GB" dirty="0"/>
+              <a:t>) the total size is ~250GB </a:t>
             </a:r>
             <a:r>
               <a:rPr lang="en-GB" dirty="0">
                 <a:sym typeface="Wingdings" panose="05000000000000000000" pitchFamily="2" charset="2"/>
               </a:rPr>
-              <a:t> reused for new generations from same </a:t>
-            </a:r>
+              <a:t> doable</a:t>
+            </a:r>
+          </a:p>
+          <a:p>
+            <a:r>
+              <a:rPr lang="en-GB" dirty="0">
+                <a:sym typeface="Wingdings" panose="05000000000000000000" pitchFamily="2" charset="2"/>
+              </a:rPr>
+              <a:t>Where is it from</a:t>
+            </a:r>
+          </a:p>
+          <a:p>
             <a:r>
               <a:rPr lang="en-GB" dirty="0" err="1">
                 <a:sym typeface="Wingdings" panose="05000000000000000000" pitchFamily="2" charset="2"/>
               </a:rPr>
-              <a:t>center</a:t>
+              <a:t>Netcdf</a:t>
             </a:r>
             <a:r>
               <a:rPr lang="en-GB" dirty="0">
                 <a:sym typeface="Wingdings" panose="05000000000000000000" pitchFamily="2" charset="2"/>
               </a:rPr>
-              <a:t>, or shared within modelling </a:t>
-            </a:r>
-            <a:r>
-              <a:rPr lang="en-GB" dirty="0" err="1">
-                <a:sym typeface="Wingdings" panose="05000000000000000000" pitchFamily="2" charset="2"/>
-              </a:rPr>
-              <a:t>centers</a:t>
-            </a:r>
-            <a:r>
-              <a:rPr lang="en-GB" dirty="0">
-                <a:sym typeface="Wingdings" panose="05000000000000000000" pitchFamily="2" charset="2"/>
-              </a:rPr>
-              <a:t>  clearly not independent</a:t>
-            </a:r>
-          </a:p>
-          <a:p>
-            <a:r>
-              <a:rPr lang="en-GB" dirty="0">
-                <a:sym typeface="Wingdings" panose="05000000000000000000" pitchFamily="2" charset="2"/>
-              </a:rPr>
-              <a:t>Problem: How to measure “distance” between models?</a:t>
-            </a:r>
-          </a:p>
-          <a:p>
-            <a:r>
-              <a:rPr lang="en-GB" dirty="0">
-                <a:sym typeface="Wingdings" panose="05000000000000000000" pitchFamily="2" charset="2"/>
-              </a:rPr>
-              <a:t>Idea: STAT 243: General principal component analysis (</a:t>
-            </a:r>
-            <a:r>
-              <a:rPr lang="en-GB" dirty="0" err="1">
-                <a:sym typeface="Wingdings" panose="05000000000000000000" pitchFamily="2" charset="2"/>
-              </a:rPr>
-              <a:t>Knutti</a:t>
-            </a:r>
-            <a:r>
-              <a:rPr lang="en-GB" dirty="0">
-                <a:sym typeface="Wingdings" panose="05000000000000000000" pitchFamily="2" charset="2"/>
-              </a:rPr>
-              <a:t>, 2012)</a:t>
-            </a:r>
-            <a:endParaRPr lang="de-DE" dirty="0"/>
+              <a:t> format</a:t>
+            </a:r>
+          </a:p>
+          <a:p>
+            <a:endParaRPr lang="en-GB" dirty="0"/>
+          </a:p>
+          <a:p>
+            <a:endParaRPr lang="en-GB" dirty="0"/>
+          </a:p>
+          <a:p>
+            <a:endParaRPr lang="en-GB" dirty="0"/>
           </a:p>
         </p:txBody>
       </p:sp>
     </p:spTree>
     <p:extLst>
       <p:ext uri="{BB962C8B-B14F-4D97-AF65-F5344CB8AC3E}">
-        <p14:creationId xmlns:p14="http://schemas.microsoft.com/office/powerpoint/2010/main" val="2931790041"/>
+        <p14:creationId xmlns:p14="http://schemas.microsoft.com/office/powerpoint/2010/main" val="536020302"/>
       </p:ext>
     </p:extLst>
   </p:cSld>
@@ -3440,7 +3488,7 @@
           <a:p>
             <a:r>
               <a:rPr lang="en-GB" dirty="0"/>
-              <a:t>Data	</a:t>
+              <a:t>What we want to do (insert catchy title)</a:t>
             </a:r>
             <a:endParaRPr lang="de-DE" dirty="0"/>
           </a:p>
@@ -3458,83 +3506,115 @@
         </p:nvSpPr>
         <p:spPr/>
         <p:txBody>
-          <a:bodyPr/>
-          <a:lstStyle/>
-          <a:p>
+          <a:bodyPr>
+            <a:normAutofit fontScale="92500" lnSpcReduction="20000"/>
+          </a:bodyPr>
+          <a:lstStyle/>
+          <a:p>
+            <a:pPr marL="0" indent="0">
+              <a:buNone/>
+            </a:pPr>
             <a:r>
               <a:rPr lang="en-GB" dirty="0"/>
-              <a:t>In total:17TB, temperature alone 3TB</a:t>
-            </a:r>
-          </a:p>
-          <a:p>
-            <a:r>
-              <a:rPr lang="en-GB" dirty="0"/>
-              <a:t>But: Monthly data smaller (for temperature “only” 250GB) </a:t>
-            </a:r>
-          </a:p>
-          <a:p>
-            <a:r>
-              <a:rPr lang="en-GB" dirty="0"/>
-              <a:t>(this doesn’t need to be presented, but: monthly data in total 6TB)</a:t>
-            </a:r>
-          </a:p>
-          <a:p>
-            <a:r>
-              <a:rPr lang="en-GB" dirty="0"/>
-              <a:t>Note to us: If we only look at formatted data (not native), monthly, for </a:t>
-            </a:r>
-            <a:r>
-              <a:rPr lang="en-GB" dirty="0" err="1"/>
-              <a:t>tas</a:t>
-            </a:r>
-            <a:r>
-              <a:rPr lang="en-GB" dirty="0"/>
-              <a:t>, </a:t>
-            </a:r>
-            <a:r>
-              <a:rPr lang="en-GB" dirty="0" err="1"/>
-              <a:t>tasmax</a:t>
-            </a:r>
-            <a:r>
-              <a:rPr lang="en-GB" dirty="0"/>
-              <a:t>, </a:t>
-            </a:r>
-            <a:r>
-              <a:rPr lang="en-GB" dirty="0" err="1"/>
-              <a:t>tasmin</a:t>
-            </a:r>
-            <a:r>
-              <a:rPr lang="en-GB" dirty="0"/>
-              <a:t> and precipitation (</a:t>
-            </a:r>
-            <a:r>
-              <a:rPr lang="en-GB" dirty="0" err="1"/>
-              <a:t>pr</a:t>
-            </a:r>
-            <a:r>
-              <a:rPr lang="en-GB" dirty="0"/>
-              <a:t>) the total size is ~250GB </a:t>
-            </a:r>
+              <a:t>- Define different metrics to measure distance between models</a:t>
+            </a:r>
+          </a:p>
+          <a:p>
+            <a:pPr marL="0" indent="0">
+              <a:buNone/>
+            </a:pPr>
             <a:r>
               <a:rPr lang="en-GB" dirty="0">
                 <a:sym typeface="Wingdings" panose="05000000000000000000" pitchFamily="2" charset="2"/>
               </a:rPr>
-              <a:t> doable</a:t>
-            </a:r>
-            <a:endParaRPr lang="en-GB" dirty="0"/>
-          </a:p>
-          <a:p>
-            <a:endParaRPr lang="en-GB" dirty="0"/>
-          </a:p>
-          <a:p>
-            <a:endParaRPr lang="en-GB" dirty="0"/>
+              <a:t>use </a:t>
+            </a:r>
+            <a:r>
+              <a:rPr lang="en-GB" dirty="0" err="1">
+                <a:sym typeface="Wingdings" panose="05000000000000000000" pitchFamily="2" charset="2"/>
+              </a:rPr>
+              <a:t>euclidian</a:t>
+            </a:r>
+            <a:r>
+              <a:rPr lang="en-GB" dirty="0">
+                <a:sym typeface="Wingdings" panose="05000000000000000000" pitchFamily="2" charset="2"/>
+              </a:rPr>
+              <a:t> distance</a:t>
+            </a:r>
+          </a:p>
+          <a:p>
+            <a:pPr>
+              <a:buFont typeface="Wingdings" panose="05000000000000000000" pitchFamily="2" charset="2"/>
+              <a:buChar char="à"/>
+            </a:pPr>
+            <a:r>
+              <a:rPr lang="en-GB" dirty="0">
+                <a:sym typeface="Wingdings" panose="05000000000000000000" pitchFamily="2" charset="2"/>
+              </a:rPr>
+              <a:t>Use general principal component analysis to define weight matrices</a:t>
+            </a:r>
+          </a:p>
+          <a:p>
+            <a:pPr>
+              <a:buFont typeface="Wingdings" panose="05000000000000000000" pitchFamily="2" charset="2"/>
+              <a:buChar char="à"/>
+            </a:pPr>
+            <a:r>
+              <a:rPr lang="en-GB" dirty="0">
+                <a:sym typeface="Wingdings" panose="05000000000000000000" pitchFamily="2" charset="2"/>
+              </a:rPr>
+              <a:t>Find a more sophisticated way of looking at inter-model distances (e.g. Tensor decomposition)</a:t>
+            </a:r>
+          </a:p>
+          <a:p>
+            <a:pPr>
+              <a:buFontTx/>
+              <a:buChar char="-"/>
+            </a:pPr>
+            <a:r>
+              <a:rPr lang="en-GB" dirty="0">
+                <a:sym typeface="Wingdings" panose="05000000000000000000" pitchFamily="2" charset="2"/>
+              </a:rPr>
+              <a:t>Change of relationships between models under different scenarios or ensembles</a:t>
+            </a:r>
+          </a:p>
+          <a:p>
+            <a:pPr>
+              <a:buFontTx/>
+              <a:buChar char="-"/>
+            </a:pPr>
+            <a:r>
+              <a:rPr lang="en-GB" dirty="0">
+                <a:sym typeface="Wingdings" panose="05000000000000000000" pitchFamily="2" charset="2"/>
+              </a:rPr>
+              <a:t>Finding new ways of visualizing the data and performing EDA</a:t>
+            </a:r>
+          </a:p>
+          <a:p>
+            <a:pPr marL="0" indent="0">
+              <a:buNone/>
+            </a:pPr>
+            <a:endParaRPr lang="en-GB" dirty="0">
+              <a:sym typeface="Wingdings" panose="05000000000000000000" pitchFamily="2" charset="2"/>
+            </a:endParaRPr>
+          </a:p>
+          <a:p>
+            <a:pPr marL="0" indent="0">
+              <a:buNone/>
+            </a:pPr>
+            <a:r>
+              <a:rPr lang="en-GB" dirty="0">
+                <a:sym typeface="Wingdings" panose="05000000000000000000" pitchFamily="2" charset="2"/>
+              </a:rPr>
+              <a:t>Problems for all approaches: Models are tuned to fit observations well (no organization wants to have an “outlier” model, even though this could prove useful) </a:t>
+            </a:r>
           </a:p>
         </p:txBody>
       </p:sp>
     </p:spTree>
     <p:extLst>
       <p:ext uri="{BB962C8B-B14F-4D97-AF65-F5344CB8AC3E}">
-        <p14:creationId xmlns:p14="http://schemas.microsoft.com/office/powerpoint/2010/main" val="536020302"/>
+        <p14:creationId xmlns:p14="http://schemas.microsoft.com/office/powerpoint/2010/main" val="1493789355"/>
       </p:ext>
     </p:extLst>
   </p:cSld>
@@ -3577,8 +3657,8 @@
           <a:lstStyle/>
           <a:p>
             <a:r>
-              <a:rPr lang="en-GB" dirty="0"/>
-              <a:t>What we want to do (insert catchy title)</a:t>
+              <a:rPr lang="pt-BR" dirty="0"/>
+              <a:t>Current challenges</a:t>
             </a:r>
             <a:endParaRPr lang="de-DE" dirty="0"/>
           </a:p>
@@ -3600,76 +3680,19 @@
           <a:lstStyle/>
           <a:p>
             <a:r>
-              <a:rPr lang="en-GB" dirty="0"/>
-              <a:t>Define different metrics to measure distance between models</a:t>
-            </a:r>
-          </a:p>
-          <a:p>
-            <a:pPr marL="0" indent="0">
-              <a:buNone/>
-            </a:pPr>
-            <a:r>
-              <a:rPr lang="en-GB" dirty="0">
-                <a:sym typeface="Wingdings" panose="05000000000000000000" pitchFamily="2" charset="2"/>
-              </a:rPr>
-              <a:t>just sum over squared distances (My idea, happy about your input guys)</a:t>
-            </a:r>
-          </a:p>
-          <a:p>
-            <a:pPr>
-              <a:buFont typeface="Wingdings" panose="05000000000000000000" pitchFamily="2" charset="2"/>
-              <a:buChar char="à"/>
-            </a:pPr>
-            <a:r>
-              <a:rPr lang="en-GB" dirty="0">
-                <a:sym typeface="Wingdings" panose="05000000000000000000" pitchFamily="2" charset="2"/>
-              </a:rPr>
-              <a:t>Use general principal component analysis to define weight matrices (write this correctly, idea from </a:t>
-            </a:r>
-            <a:r>
-              <a:rPr lang="en-GB" dirty="0" err="1">
-                <a:sym typeface="Wingdings" panose="05000000000000000000" pitchFamily="2" charset="2"/>
-              </a:rPr>
-              <a:t>knutti</a:t>
-            </a:r>
-            <a:r>
-              <a:rPr lang="en-GB" dirty="0">
-                <a:sym typeface="Wingdings" panose="05000000000000000000" pitchFamily="2" charset="2"/>
-              </a:rPr>
-              <a:t> paper)</a:t>
-            </a:r>
-          </a:p>
-          <a:p>
-            <a:pPr marL="0" indent="0">
-              <a:buNone/>
-            </a:pPr>
-            <a:endParaRPr lang="en-GB" dirty="0">
-              <a:sym typeface="Wingdings" panose="05000000000000000000" pitchFamily="2" charset="2"/>
-            </a:endParaRPr>
-          </a:p>
-          <a:p>
-            <a:pPr marL="0" indent="0">
-              <a:buNone/>
-            </a:pPr>
-            <a:r>
-              <a:rPr lang="en-GB" dirty="0">
-                <a:sym typeface="Wingdings" panose="05000000000000000000" pitchFamily="2" charset="2"/>
-              </a:rPr>
-              <a:t>Problems for all approaches: Models are tuned to fit observations well (no organization wants to have an “outlier” model, even though this could </a:t>
-            </a:r>
-            <a:r>
-              <a:rPr lang="en-GB">
-                <a:sym typeface="Wingdings" panose="05000000000000000000" pitchFamily="2" charset="2"/>
-              </a:rPr>
-              <a:t>prove useful) </a:t>
-            </a:r>
+              <a:rPr lang="pt-BR" dirty="0"/>
+              <a:t>No database that describes the models comprehensively</a:t>
+            </a:r>
+          </a:p>
+          <a:p>
+            <a:endParaRPr lang="de-DE" dirty="0"/>
           </a:p>
         </p:txBody>
       </p:sp>
     </p:spTree>
     <p:extLst>
       <p:ext uri="{BB962C8B-B14F-4D97-AF65-F5344CB8AC3E}">
-        <p14:creationId xmlns:p14="http://schemas.microsoft.com/office/powerpoint/2010/main" val="1493789355"/>
+        <p14:creationId xmlns:p14="http://schemas.microsoft.com/office/powerpoint/2010/main" val="2271079332"/>
       </p:ext>
     </p:extLst>
   </p:cSld>

</xml_diff>